<commit_message>
add answer of quiz4
</commit_message>
<xml_diff>
--- a/tutorial/T09/tut09.pptx
+++ b/tutorial/T09/tut09.pptx
@@ -4178,7 +4178,7 @@
   <pc:docChgLst>
     <pc:chgData name="CHEN, Kaiwen" userId="d2b7700c-ac07-4aef-b2bf-800af199d77b" providerId="ADAL" clId="{A71EB150-E84C-2746-8D83-BAA91FCFB9EC}"/>
     <pc:docChg chg="undo custSel addSld delSld modSld">
-      <pc:chgData name="CHEN, Kaiwen" userId="d2b7700c-ac07-4aef-b2bf-800af199d77b" providerId="ADAL" clId="{A71EB150-E84C-2746-8D83-BAA91FCFB9EC}" dt="2024-10-30T10:51:23.885" v="1547" actId="1076"/>
+      <pc:chgData name="CHEN, Kaiwen" userId="d2b7700c-ac07-4aef-b2bf-800af199d77b" providerId="ADAL" clId="{A71EB150-E84C-2746-8D83-BAA91FCFB9EC}" dt="2024-10-31T07:15:52.951" v="1660" actId="403"/>
       <pc:docMkLst>
         <pc:docMk/>
       </pc:docMkLst>
@@ -4206,13 +4206,13 @@
         </pc:spChg>
       </pc:sldChg>
       <pc:sldChg chg="modSp mod">
-        <pc:chgData name="CHEN, Kaiwen" userId="d2b7700c-ac07-4aef-b2bf-800af199d77b" providerId="ADAL" clId="{A71EB150-E84C-2746-8D83-BAA91FCFB9EC}" dt="2024-10-30T10:33:48.204" v="1428" actId="20577"/>
+        <pc:chgData name="CHEN, Kaiwen" userId="d2b7700c-ac07-4aef-b2bf-800af199d77b" providerId="ADAL" clId="{A71EB150-E84C-2746-8D83-BAA91FCFB9EC}" dt="2024-10-31T03:09:50.727" v="1593" actId="20577"/>
         <pc:sldMkLst>
           <pc:docMk/>
           <pc:sldMk cId="4196136796" sldId="624"/>
         </pc:sldMkLst>
         <pc:spChg chg="mod">
-          <ac:chgData name="CHEN, Kaiwen" userId="d2b7700c-ac07-4aef-b2bf-800af199d77b" providerId="ADAL" clId="{A71EB150-E84C-2746-8D83-BAA91FCFB9EC}" dt="2024-10-30T10:33:48.204" v="1428" actId="20577"/>
+          <ac:chgData name="CHEN, Kaiwen" userId="d2b7700c-ac07-4aef-b2bf-800af199d77b" providerId="ADAL" clId="{A71EB150-E84C-2746-8D83-BAA91FCFB9EC}" dt="2024-10-31T03:09:50.727" v="1593" actId="20577"/>
           <ac:spMkLst>
             <pc:docMk/>
             <pc:sldMk cId="4196136796" sldId="624"/>
@@ -4556,7 +4556,7 @@
         </pc:spChg>
       </pc:sldChg>
       <pc:sldChg chg="addSp modSp add mod">
-        <pc:chgData name="CHEN, Kaiwen" userId="d2b7700c-ac07-4aef-b2bf-800af199d77b" providerId="ADAL" clId="{A71EB150-E84C-2746-8D83-BAA91FCFB9EC}" dt="2024-10-30T10:51:23.885" v="1547" actId="1076"/>
+        <pc:chgData name="CHEN, Kaiwen" userId="d2b7700c-ac07-4aef-b2bf-800af199d77b" providerId="ADAL" clId="{A71EB150-E84C-2746-8D83-BAA91FCFB9EC}" dt="2024-10-31T07:15:52.951" v="1660" actId="403"/>
         <pc:sldMkLst>
           <pc:docMk/>
           <pc:sldMk cId="1502706178" sldId="2852"/>
@@ -4578,7 +4578,7 @@
           </ac:spMkLst>
         </pc:spChg>
         <pc:spChg chg="add mod">
-          <ac:chgData name="CHEN, Kaiwen" userId="d2b7700c-ac07-4aef-b2bf-800af199d77b" providerId="ADAL" clId="{A71EB150-E84C-2746-8D83-BAA91FCFB9EC}" dt="2024-10-30T10:51:23.885" v="1547" actId="1076"/>
+          <ac:chgData name="CHEN, Kaiwen" userId="d2b7700c-ac07-4aef-b2bf-800af199d77b" providerId="ADAL" clId="{A71EB150-E84C-2746-8D83-BAA91FCFB9EC}" dt="2024-10-31T07:15:52.951" v="1660" actId="403"/>
           <ac:spMkLst>
             <pc:docMk/>
             <pc:sldMk cId="1502706178" sldId="2852"/>
@@ -4587,7 +4587,7 @@
         </pc:spChg>
       </pc:sldChg>
       <pc:sldChg chg="addSp modSp add mod">
-        <pc:chgData name="CHEN, Kaiwen" userId="d2b7700c-ac07-4aef-b2bf-800af199d77b" providerId="ADAL" clId="{A71EB150-E84C-2746-8D83-BAA91FCFB9EC}" dt="2024-10-30T10:48:07.939" v="1442" actId="20578"/>
+        <pc:chgData name="CHEN, Kaiwen" userId="d2b7700c-ac07-4aef-b2bf-800af199d77b" providerId="ADAL" clId="{A71EB150-E84C-2746-8D83-BAA91FCFB9EC}" dt="2024-10-31T03:13:18.849" v="1597" actId="207"/>
         <pc:sldMkLst>
           <pc:docMk/>
           <pc:sldMk cId="1144934398" sldId="2853"/>
@@ -4617,7 +4617,7 @@
           </ac:spMkLst>
         </pc:spChg>
         <pc:graphicFrameChg chg="add mod modGraphic">
-          <ac:chgData name="CHEN, Kaiwen" userId="d2b7700c-ac07-4aef-b2bf-800af199d77b" providerId="ADAL" clId="{A71EB150-E84C-2746-8D83-BAA91FCFB9EC}" dt="2024-10-30T03:24:27.668" v="1200" actId="14734"/>
+          <ac:chgData name="CHEN, Kaiwen" userId="d2b7700c-ac07-4aef-b2bf-800af199d77b" providerId="ADAL" clId="{A71EB150-E84C-2746-8D83-BAA91FCFB9EC}" dt="2024-10-31T03:13:18.849" v="1597" actId="207"/>
           <ac:graphicFrameMkLst>
             <pc:docMk/>
             <pc:sldMk cId="1144934398" sldId="2853"/>
@@ -4947,7 +4947,7 @@
           <a:p>
             <a:fld id="{90751E9F-A845-4914-A3CC-CC345012599B}" type="datetimeFigureOut">
               <a:rPr lang="en-US" smtClean="0"/>
-              <a:t>10/30/24</a:t>
+              <a:t>10/31/24</a:t>
             </a:fld>
             <a:endParaRPr lang="en-US"/>
           </a:p>
@@ -6968,7 +6968,7 @@
           <a:p>
             <a:fld id="{4110DD41-9B81-A544-8498-92133950A0E4}" type="datetime1">
               <a:rPr lang="en-US" smtClean="0"/>
-              <a:t>10/30/24</a:t>
+              <a:t>10/31/24</a:t>
             </a:fld>
             <a:endParaRPr lang="en-US"/>
           </a:p>
@@ -8811,7 +8811,7 @@
           </a:ln>
           <a:extLst>
             <a:ext uri="{C572A759-6A51-4108-AA02-DFA0A04FC94B}">
-              <ma14:wrappingTextBoxFlag xmlns="" xmlns:ma14="http://schemas.microsoft.com/office/mac/drawingml/2011/main" xmlns:a14="http://schemas.microsoft.com/office/drawing/2010/main" xmlns:m="http://schemas.openxmlformats.org/officeDocument/2006/math" val="1"/>
+              <ma14:wrappingTextBoxFlag xmlns:m="http://schemas.openxmlformats.org/officeDocument/2006/math" xmlns:a14="http://schemas.microsoft.com/office/drawing/2010/main" xmlns:ma14="http://schemas.microsoft.com/office/mac/drawingml/2011/main" xmlns="" val="1"/>
             </a:ext>
           </a:extLst>
         </p:spPr>
@@ -8850,7 +8850,7 @@
           </a:ln>
           <a:extLst>
             <a:ext uri="{C572A759-6A51-4108-AA02-DFA0A04FC94B}">
-              <ma14:wrappingTextBoxFlag xmlns="" xmlns:ma14="http://schemas.microsoft.com/office/mac/drawingml/2011/main" xmlns:a14="http://schemas.microsoft.com/office/drawing/2010/main" xmlns:m="http://schemas.openxmlformats.org/officeDocument/2006/math" val="1"/>
+              <ma14:wrappingTextBoxFlag xmlns:m="http://schemas.openxmlformats.org/officeDocument/2006/math" xmlns:a14="http://schemas.microsoft.com/office/drawing/2010/main" xmlns:ma14="http://schemas.microsoft.com/office/mac/drawingml/2011/main" xmlns="" val="1"/>
             </a:ext>
           </a:extLst>
         </p:spPr>
@@ -11142,7 +11142,7 @@
           </a:ln>
           <a:extLst>
             <a:ext uri="{C572A759-6A51-4108-AA02-DFA0A04FC94B}">
-              <ma14:wrappingTextBoxFlag xmlns="" xmlns:ma14="http://schemas.microsoft.com/office/mac/drawingml/2011/main" xmlns:a14="http://schemas.microsoft.com/office/drawing/2010/main" xmlns:m="http://schemas.openxmlformats.org/officeDocument/2006/math" val="1"/>
+              <ma14:wrappingTextBoxFlag xmlns:m="http://schemas.openxmlformats.org/officeDocument/2006/math" xmlns:a14="http://schemas.microsoft.com/office/drawing/2010/main" xmlns:ma14="http://schemas.microsoft.com/office/mac/drawingml/2011/main" xmlns="" val="1"/>
             </a:ext>
           </a:extLst>
         </p:spPr>
@@ -11432,7 +11432,7 @@
           <p:nvPr>
             <p:extLst>
               <p:ext uri="{D42A27DB-BD31-4B8C-83A1-F6EECF244321}">
-                <p14:modId xmlns:p14="http://schemas.microsoft.com/office/powerpoint/2010/main" val="387134207"/>
+                <p14:modId xmlns:p14="http://schemas.microsoft.com/office/powerpoint/2010/main" val="809097981"/>
               </p:ext>
             </p:extLst>
           </p:nvPr>
@@ -11677,11 +11677,19 @@
                             <a:schemeClr val="tx1"/>
                           </a:solidFill>
                         </a:rPr>
-                        <a:t>-&gt;1A2B(1)</a:t>
+                        <a:t>-&gt;</a:t>
+                      </a:r>
+                      <a:r>
+                        <a:rPr lang="en-US" altLang="zh-HK" sz="1400" b="1" dirty="0">
+                          <a:solidFill>
+                            <a:srgbClr val="FF0000"/>
+                          </a:solidFill>
+                        </a:rPr>
+                        <a:t>1A2B(1)</a:t>
                       </a:r>
                       <a:endParaRPr lang="zh-HK" altLang="en-US" sz="1400" b="1" dirty="0">
                         <a:solidFill>
-                          <a:schemeClr val="tx1"/>
+                          <a:srgbClr val="FF0000"/>
                         </a:solidFill>
                       </a:endParaRPr>
                     </a:p>
@@ -11696,14 +11704,14 @@
                       <a:r>
                         <a:rPr lang="en-US" altLang="zh-HK" sz="1400" b="1" dirty="0">
                           <a:solidFill>
-                            <a:srgbClr val="FF0000"/>
+                            <a:schemeClr val="tx1"/>
                           </a:solidFill>
                         </a:rPr>
                         <a:t>7A9F(1)</a:t>
                       </a:r>
                       <a:endParaRPr lang="zh-HK" altLang="en-US" sz="1400" b="1" dirty="0">
                         <a:solidFill>
-                          <a:srgbClr val="FF0000"/>
+                          <a:schemeClr val="tx1"/>
                         </a:solidFill>
                       </a:endParaRPr>
                     </a:p>
@@ -12913,8 +12921,8 @@
         </p:nvSpPr>
         <p:spPr>
           <a:xfrm>
-            <a:off x="1110342" y="941294"/>
-            <a:ext cx="9600764" cy="6632585"/>
+            <a:off x="844551" y="970815"/>
+            <a:ext cx="9598298" cy="6324808"/>
           </a:xfrm>
           <a:prstGeom prst="rect">
             <a:avLst/>
@@ -12952,7 +12960,7 @@
               <a:buSzPct val="100000"/>
             </a:pPr>
             <a:r>
-              <a:rPr lang="en-HK" altLang="zh-HK" sz="2000" dirty="0">
+              <a:rPr lang="en-HK" altLang="zh-HK" dirty="0">
                 <a:solidFill>
                   <a:srgbClr val="202020"/>
                 </a:solidFill>
@@ -12972,7 +12980,27 @@
               <a:buChar char="Ø"/>
             </a:pPr>
             <a:r>
-              <a:rPr lang="en-HK" altLang="zh-HK" sz="2000" dirty="0">
+              <a:rPr lang="en-HK" altLang="zh-HK" dirty="0">
+                <a:solidFill>
+                  <a:srgbClr val="202020"/>
+                </a:solidFill>
+                <a:latin typeface="Gill Sans MT" panose="020B0502020104020203" pitchFamily="34" charset="0"/>
+                <a:sym typeface="Helvetica"/>
+              </a:rPr>
+              <a:t>The Clock Pointer will not be moved forward</a:t>
+            </a:r>
+          </a:p>
+          <a:p>
+            <a:pPr marL="285750" indent="-285750" defTabSz="412750">
+              <a:spcBef>
+                <a:spcPts val="2950"/>
+              </a:spcBef>
+              <a:buSzPct val="100000"/>
+              <a:buFont typeface="Wingdings" pitchFamily="2" charset="2"/>
+              <a:buChar char="Ø"/>
+            </a:pPr>
+            <a:r>
+              <a:rPr lang="en-HK" altLang="zh-HK" dirty="0">
                 <a:solidFill>
                   <a:srgbClr val="202020"/>
                 </a:solidFill>
@@ -12990,7 +13018,7 @@
               <a:buSzPct val="100000"/>
             </a:pPr>
             <a:r>
-              <a:rPr lang="en-HK" altLang="zh-HK" sz="2000" dirty="0">
+              <a:rPr lang="en-HK" altLang="zh-HK" dirty="0">
                 <a:solidFill>
                   <a:srgbClr val="202020"/>
                 </a:solidFill>
@@ -13010,15 +13038,15 @@
               <a:buChar char="Ø"/>
             </a:pPr>
             <a:r>
-              <a:rPr lang="en-HK" altLang="zh-HK" sz="2000" dirty="0">
+              <a:rPr lang="en-HK" altLang="zh-HK" dirty="0">
                 <a:solidFill>
                   <a:srgbClr val="202020"/>
                 </a:solidFill>
                 <a:latin typeface="Gill Sans MT" panose="020B0502020104020203" pitchFamily="34" charset="0"/>
               </a:rPr>
-              <a:t>Search for Empty Line. First preference is to find an empty line. </a:t>
+              <a:t>Search for empty line. First preference is to find an empty line. </a:t>
             </a:r>
-            <a:endParaRPr lang="en-HK" altLang="zh-HK" sz="2000" dirty="0">
+            <a:endParaRPr lang="en-HK" altLang="zh-HK" dirty="0">
               <a:solidFill>
                 <a:srgbClr val="202020"/>
               </a:solidFill>
@@ -13036,7 +13064,7 @@
               <a:buChar char="Ø"/>
             </a:pPr>
             <a:r>
-              <a:rPr lang="en-HK" altLang="zh-HK" sz="2000" dirty="0">
+              <a:rPr lang="en-HK" altLang="zh-HK" dirty="0">
                 <a:solidFill>
                   <a:srgbClr val="202020"/>
                 </a:solidFill>
@@ -13056,7 +13084,7 @@
               <a:buChar char="Ø"/>
             </a:pPr>
             <a:r>
-              <a:rPr lang="en-HK" altLang="zh-HK" sz="2000" dirty="0">
+              <a:rPr lang="en-HK" altLang="zh-HK" dirty="0">
                 <a:solidFill>
                   <a:srgbClr val="202020"/>
                 </a:solidFill>
@@ -13076,14 +13104,14 @@
               <a:buChar char="Ø"/>
             </a:pPr>
             <a:r>
-              <a:rPr lang="en-HK" altLang="zh-HK" sz="2000" dirty="0">
+              <a:rPr lang="en-HK" altLang="zh-HK" dirty="0">
                 <a:solidFill>
                   <a:srgbClr val="202020"/>
                 </a:solidFill>
                 <a:latin typeface="Gill Sans MT" panose="020B0502020104020203" pitchFamily="34" charset="0"/>
                 <a:sym typeface="Helvetica"/>
               </a:rPr>
-              <a:t>Replace the first line whose reference bit is 0. </a:t>
+              <a:t>Replace the first line whose reference bit is 0.  Set the reference bit of the new line to 1. </a:t>
             </a:r>
           </a:p>
           <a:p>
@@ -13096,27 +13124,7 @@
               <a:buChar char="Ø"/>
             </a:pPr>
             <a:r>
-              <a:rPr lang="en-HK" altLang="zh-HK" sz="2000" dirty="0">
-                <a:solidFill>
-                  <a:srgbClr val="202020"/>
-                </a:solidFill>
-                <a:latin typeface="Gill Sans MT" panose="020B0502020104020203" pitchFamily="34" charset="0"/>
-                <a:sym typeface="Helvetica"/>
-              </a:rPr>
-              <a:t>Set the reference bit of the new line to 1. </a:t>
-            </a:r>
-          </a:p>
-          <a:p>
-            <a:pPr marL="742950" lvl="1" indent="-285750" defTabSz="412750">
-              <a:spcBef>
-                <a:spcPts val="2950"/>
-              </a:spcBef>
-              <a:buSzPct val="100000"/>
-              <a:buFont typeface="Wingdings" pitchFamily="2" charset="2"/>
-              <a:buChar char="Ø"/>
-            </a:pPr>
-            <a:r>
-              <a:rPr lang="en-HK" altLang="zh-HK" sz="2000" dirty="0">
+              <a:rPr lang="en-HK" altLang="zh-HK" dirty="0">
                 <a:solidFill>
                   <a:srgbClr val="202020"/>
                 </a:solidFill>
@@ -13135,7 +13143,7 @@
               <a:buFont typeface="Wingdings" pitchFamily="2" charset="2"/>
               <a:buChar char="Ø"/>
             </a:pPr>
-            <a:endParaRPr lang="en-HK" altLang="zh-HK" sz="2000" dirty="0">
+            <a:endParaRPr lang="en-HK" altLang="zh-HK" dirty="0">
               <a:solidFill>
                 <a:srgbClr val="202020"/>
               </a:solidFill>
@@ -13364,7 +13372,7 @@
               <a:rPr lang="en-US" sz="2400" dirty="0">
                 <a:cs typeface="Helvetica"/>
               </a:rPr>
-              <a:t>Due at </a:t>
+              <a:t>Due at 6</a:t>
             </a:r>
             <a:r>
               <a:rPr kumimoji="0" lang="en-US" altLang="zh-CN" sz="2400" b="0" i="0" u="none" strike="noStrike" kern="0" cap="none" spc="0" normalizeH="0" baseline="0" noProof="0" dirty="0">
@@ -13381,7 +13389,7 @@
                 <a:cs typeface="Helvetica"/>
                 <a:sym typeface="Helvetica"/>
               </a:rPr>
-              <a:t>18:00:00 p.m., Mon, Nov 4</a:t>
+              <a:t>:00:00 p.m., Mon, Nov 4</a:t>
             </a:r>
             <a:r>
               <a:rPr kumimoji="0" lang="en-US" altLang="zh-CN" sz="2400" b="0" i="0" u="none" strike="noStrike" kern="0" cap="none" spc="0" normalizeH="0" baseline="30000" noProof="0" dirty="0">
@@ -13433,7 +13441,7 @@
               <a:rPr lang="en-US" altLang="zh-CN" sz="2400" dirty="0">
                 <a:cs typeface="Helvetica"/>
               </a:rPr>
-              <a:t>Due at </a:t>
+              <a:t>Due at 6</a:t>
             </a:r>
             <a:r>
               <a:rPr kumimoji="0" lang="en-US" altLang="zh-CN" sz="2400" b="0" i="0" u="none" strike="noStrike" kern="0" cap="none" spc="0" normalizeH="0" baseline="0" noProof="0" dirty="0">
@@ -13450,7 +13458,7 @@
                 <a:cs typeface="Helvetica"/>
                 <a:sym typeface="Helvetica"/>
               </a:rPr>
-              <a:t>18:00:00 p.m., Mon, Nov 18</a:t>
+              <a:t>:00:00 p.m., Mon, Nov 18</a:t>
             </a:r>
             <a:r>
               <a:rPr kumimoji="0" lang="en-US" altLang="zh-CN" sz="2400" b="0" i="0" u="none" strike="noStrike" kern="0" cap="none" spc="0" normalizeH="0" baseline="30000" noProof="0" dirty="0">
@@ -13468,6 +13476,27 @@
                 <a:sym typeface="Helvetica"/>
               </a:rPr>
               <a:t>th</a:t>
+            </a:r>
+            <a:endParaRPr lang="en-US" altLang="zh-CN" sz="2400" baseline="30000" dirty="0">
+              <a:cs typeface="Helvetica"/>
+            </a:endParaRPr>
+          </a:p>
+          <a:p>
+            <a:pPr marL="288925" indent="-288925">
+              <a:spcBef>
+                <a:spcPts val="1200"/>
+              </a:spcBef>
+              <a:buFont typeface="Wingdings" pitchFamily="2" charset="2"/>
+              <a:buChar char="Ø"/>
+              <a:defRPr/>
+            </a:pPr>
+            <a:r>
+              <a:rPr lang="en-US" altLang="zh-CN" sz="2400" b="1" dirty="0" err="1"/>
+              <a:t>ureply</a:t>
+            </a:r>
+            <a:r>
+              <a:rPr lang="en-US" altLang="zh-CN" sz="2400" b="1" dirty="0"/>
+              <a:t> quiz today</a:t>
             </a:r>
           </a:p>
         </p:txBody>
@@ -14824,7 +14853,7 @@
                     <a:bodyPr/>
                     <a:lstStyle/>
                     <a:p>
-                      <a:endParaRPr lang="zh-HK" altLang="en-US" b="1"/>
+                      <a:endParaRPr lang="zh-HK" altLang="en-US" b="1" dirty="0"/>
                     </a:p>
                   </a:txBody>
                   <a:tcPr/>

</xml_diff>